<commit_message>
Updated setup instructions to be clearer
</commit_message>
<xml_diff>
--- a/gitSetUpInstructions.pptx
+++ b/gitSetUpInstructions.pptx
@@ -5,14 +5,15 @@
     <p:sldMasterId id="2147483648" r:id="rId1"/>
   </p:sldMasterIdLst>
   <p:notesMasterIdLst>
-    <p:notesMasterId r:id="rId7"/>
+    <p:notesMasterId r:id="rId8"/>
   </p:notesMasterIdLst>
   <p:sldIdLst>
     <p:sldId id="263" r:id="rId2"/>
     <p:sldId id="282" r:id="rId3"/>
-    <p:sldId id="283" r:id="rId4"/>
-    <p:sldId id="286" r:id="rId5"/>
-    <p:sldId id="285" r:id="rId6"/>
+    <p:sldId id="287" r:id="rId4"/>
+    <p:sldId id="283" r:id="rId5"/>
+    <p:sldId id="286" r:id="rId6"/>
+    <p:sldId id="285" r:id="rId7"/>
   </p:sldIdLst>
   <p:sldSz cx="12192000" cy="6858000"/>
   <p:notesSz cx="6858000" cy="9144000"/>
@@ -3729,7 +3730,7 @@
         <p:spPr>
           <a:xfrm>
             <a:off x="280737" y="1401288"/>
-            <a:ext cx="5621299" cy="5248894"/>
+            <a:ext cx="5550567" cy="5248894"/>
           </a:xfrm>
         </p:spPr>
         <p:txBody>
@@ -3765,7 +3766,7 @@
             </a:r>
             <a:r>
               <a:rPr lang="en-US" sz="2400" dirty="0"/>
-              <a:t>)</a:t>
+              <a:t>/downloads)</a:t>
             </a:r>
           </a:p>
           <a:p>
@@ -3986,6 +3987,291 @@
           <a:chExt cx="0" cy="0"/>
         </a:xfrm>
       </p:grpSpPr>
+      <p:sp>
+        <p:nvSpPr>
+          <p:cNvPr id="2" name="Title 1">
+            <a:extLst>
+              <a:ext uri="{FF2B5EF4-FFF2-40B4-BE49-F238E27FC236}">
+                <a16:creationId xmlns:a16="http://schemas.microsoft.com/office/drawing/2014/main" id="{3923D639-F719-46F0-4E86-457E3A8F7327}"/>
+              </a:ext>
+            </a:extLst>
+          </p:cNvPr>
+          <p:cNvSpPr>
+            <a:spLocks noGrp="1"/>
+          </p:cNvSpPr>
+          <p:nvPr>
+            <p:ph type="title"/>
+          </p:nvPr>
+        </p:nvSpPr>
+        <p:spPr/>
+        <p:txBody>
+          <a:bodyPr/>
+          <a:lstStyle/>
+          <a:p>
+            <a:r>
+              <a:rPr lang="en-US" dirty="0"/>
+              <a:t>Tutorial – Initialize</a:t>
+            </a:r>
+          </a:p>
+        </p:txBody>
+      </p:sp>
+      <p:sp>
+        <p:nvSpPr>
+          <p:cNvPr id="3" name="Content Placeholder 2">
+            <a:extLst>
+              <a:ext uri="{FF2B5EF4-FFF2-40B4-BE49-F238E27FC236}">
+                <a16:creationId xmlns:a16="http://schemas.microsoft.com/office/drawing/2014/main" id="{8475AAF9-A248-ADAD-875E-5B58C3D2D4C7}"/>
+              </a:ext>
+            </a:extLst>
+          </p:cNvPr>
+          <p:cNvSpPr>
+            <a:spLocks noGrp="1"/>
+          </p:cNvSpPr>
+          <p:nvPr>
+            <p:ph idx="1"/>
+          </p:nvPr>
+        </p:nvSpPr>
+        <p:spPr>
+          <a:xfrm>
+            <a:off x="113804" y="1690688"/>
+            <a:ext cx="11657447" cy="4903860"/>
+          </a:xfrm>
+        </p:spPr>
+        <p:txBody>
+          <a:bodyPr>
+            <a:normAutofit/>
+          </a:bodyPr>
+          <a:lstStyle/>
+          <a:p>
+            <a:r>
+              <a:rPr lang="en-US" sz="2400" dirty="0"/>
+              <a:t>Add your info to the config file (command line)</a:t>
+            </a:r>
+          </a:p>
+          <a:p>
+            <a:r>
+              <a:rPr lang="en-US" sz="2400" dirty="0">
+                <a:solidFill>
+                  <a:schemeClr val="bg2">
+                    <a:lumMod val="75000"/>
+                  </a:schemeClr>
+                </a:solidFill>
+              </a:rPr>
+              <a:t>Authenticate GitHub Desktop</a:t>
+            </a:r>
+          </a:p>
+        </p:txBody>
+      </p:sp>
+      <p:grpSp>
+        <p:nvGrpSpPr>
+          <p:cNvPr id="9" name="Group 8">
+            <a:extLst>
+              <a:ext uri="{FF2B5EF4-FFF2-40B4-BE49-F238E27FC236}">
+                <a16:creationId xmlns:a16="http://schemas.microsoft.com/office/drawing/2014/main" id="{F101F8F6-7A8F-28B9-2630-0540A3E6B971}"/>
+              </a:ext>
+            </a:extLst>
+          </p:cNvPr>
+          <p:cNvGrpSpPr/>
+          <p:nvPr/>
+        </p:nvGrpSpPr>
+        <p:grpSpPr>
+          <a:xfrm>
+            <a:off x="918347" y="2882900"/>
+            <a:ext cx="4468146" cy="3393776"/>
+            <a:chOff x="7303105" y="658575"/>
+            <a:chExt cx="4468146" cy="3393776"/>
+          </a:xfrm>
+        </p:grpSpPr>
+        <p:pic>
+          <p:nvPicPr>
+            <p:cNvPr id="5" name="Picture 4">
+              <a:extLst>
+                <a:ext uri="{FF2B5EF4-FFF2-40B4-BE49-F238E27FC236}">
+                  <a16:creationId xmlns:a16="http://schemas.microsoft.com/office/drawing/2014/main" id="{2481BCF0-7803-706D-2D03-12117D6D4DD1}"/>
+                </a:ext>
+              </a:extLst>
+            </p:cNvPr>
+            <p:cNvPicPr>
+              <a:picLocks noChangeAspect="1"/>
+            </p:cNvPicPr>
+            <p:nvPr/>
+          </p:nvPicPr>
+          <p:blipFill>
+            <a:blip r:embed="rId2"/>
+            <a:stretch>
+              <a:fillRect/>
+            </a:stretch>
+          </p:blipFill>
+          <p:spPr>
+            <a:xfrm>
+              <a:off x="7412790" y="1027906"/>
+              <a:ext cx="3688347" cy="3024445"/>
+            </a:xfrm>
+            <a:prstGeom prst="rect">
+              <a:avLst/>
+            </a:prstGeom>
+          </p:spPr>
+        </p:pic>
+        <p:sp>
+          <p:nvSpPr>
+            <p:cNvPr id="7" name="TextBox 6">
+              <a:extLst>
+                <a:ext uri="{FF2B5EF4-FFF2-40B4-BE49-F238E27FC236}">
+                  <a16:creationId xmlns:a16="http://schemas.microsoft.com/office/drawing/2014/main" id="{EFF43BB7-C065-621D-7259-3C36D90E02C8}"/>
+                </a:ext>
+              </a:extLst>
+            </p:cNvPr>
+            <p:cNvSpPr txBox="1"/>
+            <p:nvPr/>
+          </p:nvSpPr>
+          <p:spPr>
+            <a:xfrm>
+              <a:off x="7303105" y="658575"/>
+              <a:ext cx="4468146" cy="369332"/>
+            </a:xfrm>
+            <a:prstGeom prst="rect">
+              <a:avLst/>
+            </a:prstGeom>
+            <a:noFill/>
+          </p:spPr>
+          <p:txBody>
+            <a:bodyPr wrap="none" rtlCol="0">
+              <a:spAutoFit/>
+            </a:bodyPr>
+            <a:lstStyle/>
+            <a:p>
+              <a:r>
+                <a:rPr lang="en-US" dirty="0"/>
+                <a:t>1. Open up terminal (or </a:t>
+              </a:r>
+              <a:r>
+                <a:rPr lang="en-US" dirty="0" err="1"/>
+                <a:t>gitBASH</a:t>
+              </a:r>
+              <a:r>
+                <a:rPr lang="en-US" dirty="0"/>
+                <a:t> for windows)</a:t>
+              </a:r>
+            </a:p>
+          </p:txBody>
+        </p:sp>
+      </p:grpSp>
+      <p:grpSp>
+        <p:nvGrpSpPr>
+          <p:cNvPr id="15" name="Group 14">
+            <a:extLst>
+              <a:ext uri="{FF2B5EF4-FFF2-40B4-BE49-F238E27FC236}">
+                <a16:creationId xmlns:a16="http://schemas.microsoft.com/office/drawing/2014/main" id="{721B9F56-EAC7-7A05-80CD-EBED45EF3675}"/>
+              </a:ext>
+            </a:extLst>
+          </p:cNvPr>
+          <p:cNvGrpSpPr/>
+          <p:nvPr/>
+        </p:nvGrpSpPr>
+        <p:grpSpPr>
+          <a:xfrm>
+            <a:off x="6032500" y="3700165"/>
+            <a:ext cx="5321300" cy="1523242"/>
+            <a:chOff x="5226384" y="4148746"/>
+            <a:chExt cx="5321300" cy="1523242"/>
+          </a:xfrm>
+        </p:grpSpPr>
+        <p:pic>
+          <p:nvPicPr>
+            <p:cNvPr id="11" name="Picture 10">
+              <a:extLst>
+                <a:ext uri="{FF2B5EF4-FFF2-40B4-BE49-F238E27FC236}">
+                  <a16:creationId xmlns:a16="http://schemas.microsoft.com/office/drawing/2014/main" id="{9E764947-A312-3099-CF2F-2BECF72A6D67}"/>
+                </a:ext>
+              </a:extLst>
+            </p:cNvPr>
+            <p:cNvPicPr>
+              <a:picLocks noChangeAspect="1"/>
+            </p:cNvPicPr>
+            <p:nvPr/>
+          </p:nvPicPr>
+          <p:blipFill>
+            <a:blip r:embed="rId3"/>
+            <a:stretch>
+              <a:fillRect/>
+            </a:stretch>
+          </p:blipFill>
+          <p:spPr>
+            <a:xfrm>
+              <a:off x="5226384" y="4579788"/>
+              <a:ext cx="5321300" cy="1092200"/>
+            </a:xfrm>
+            <a:prstGeom prst="rect">
+              <a:avLst/>
+            </a:prstGeom>
+          </p:spPr>
+        </p:pic>
+        <p:sp>
+          <p:nvSpPr>
+            <p:cNvPr id="13" name="TextBox 12">
+              <a:extLst>
+                <a:ext uri="{FF2B5EF4-FFF2-40B4-BE49-F238E27FC236}">
+                  <a16:creationId xmlns:a16="http://schemas.microsoft.com/office/drawing/2014/main" id="{31C31D39-57D3-4B82-C2D5-C35803D128E3}"/>
+                </a:ext>
+              </a:extLst>
+            </p:cNvPr>
+            <p:cNvSpPr txBox="1"/>
+            <p:nvPr/>
+          </p:nvSpPr>
+          <p:spPr>
+            <a:xfrm>
+              <a:off x="5226384" y="4148746"/>
+              <a:ext cx="3235694" cy="369332"/>
+            </a:xfrm>
+            <a:prstGeom prst="rect">
+              <a:avLst/>
+            </a:prstGeom>
+            <a:noFill/>
+          </p:spPr>
+          <p:txBody>
+            <a:bodyPr wrap="none" rtlCol="0">
+              <a:spAutoFit/>
+            </a:bodyPr>
+            <a:lstStyle/>
+            <a:p>
+              <a:r>
+                <a:rPr lang="en-US" dirty="0"/>
+                <a:t>2. Add your username and email</a:t>
+              </a:r>
+            </a:p>
+          </p:txBody>
+        </p:sp>
+      </p:grpSp>
+    </p:spTree>
+    <p:extLst>
+      <p:ext uri="{BB962C8B-B14F-4D97-AF65-F5344CB8AC3E}">
+        <p14:creationId xmlns:p14="http://schemas.microsoft.com/office/powerpoint/2010/main" val="2426871943"/>
+      </p:ext>
+    </p:extLst>
+  </p:cSld>
+  <p:clrMapOvr>
+    <a:masterClrMapping/>
+  </p:clrMapOvr>
+</p:sld>
+</file>
+
+<file path=ppt/slides/slide3.xml><?xml version="1.0" encoding="utf-8"?>
+<p:sld xmlns:a="http://schemas.openxmlformats.org/drawingml/2006/main" xmlns:r="http://schemas.openxmlformats.org/officeDocument/2006/relationships" xmlns:p="http://schemas.openxmlformats.org/presentationml/2006/main">
+  <p:cSld>
+    <p:spTree>
+      <p:nvGrpSpPr>
+        <p:cNvPr id="1" name=""/>
+        <p:cNvGrpSpPr/>
+        <p:nvPr/>
+      </p:nvGrpSpPr>
+      <p:grpSpPr>
+        <a:xfrm>
+          <a:off x="0" y="0"/>
+          <a:ext cx="0" cy="0"/>
+          <a:chOff x="0" y="0"/>
+          <a:chExt cx="0" cy="0"/>
+        </a:xfrm>
+      </p:grpSpPr>
       <p:pic>
         <p:nvPicPr>
           <p:cNvPr id="18" name="Picture 17">
@@ -4073,7 +4359,13 @@
           <a:lstStyle/>
           <a:p>
             <a:r>
-              <a:rPr lang="en-US" sz="2400" dirty="0"/>
+              <a:rPr lang="en-US" sz="2400" dirty="0">
+                <a:solidFill>
+                  <a:schemeClr val="bg2">
+                    <a:lumMod val="75000"/>
+                  </a:schemeClr>
+                </a:solidFill>
+              </a:rPr>
               <a:t>Add your info to the config file (command line)</a:t>
             </a:r>
           </a:p>
@@ -4085,92 +4377,6 @@
           </a:p>
         </p:txBody>
       </p:sp>
-      <p:grpSp>
-        <p:nvGrpSpPr>
-          <p:cNvPr id="19" name="Group 18">
-            <a:extLst>
-              <a:ext uri="{FF2B5EF4-FFF2-40B4-BE49-F238E27FC236}">
-                <a16:creationId xmlns:a16="http://schemas.microsoft.com/office/drawing/2014/main" id="{9AC56CB1-7B45-34AD-9170-F37A05C8332B}"/>
-              </a:ext>
-            </a:extLst>
-          </p:cNvPr>
-          <p:cNvGrpSpPr/>
-          <p:nvPr/>
-        </p:nvGrpSpPr>
-        <p:grpSpPr>
-          <a:xfrm>
-            <a:off x="6449292" y="362006"/>
-            <a:ext cx="5628904" cy="1123605"/>
-            <a:chOff x="6449292" y="362006"/>
-            <a:chExt cx="5628904" cy="1123605"/>
-          </a:xfrm>
-        </p:grpSpPr>
-        <p:pic>
-          <p:nvPicPr>
-            <p:cNvPr id="6" name="Picture 5">
-              <a:extLst>
-                <a:ext uri="{FF2B5EF4-FFF2-40B4-BE49-F238E27FC236}">
-                  <a16:creationId xmlns:a16="http://schemas.microsoft.com/office/drawing/2014/main" id="{ADC8931C-74B0-1054-FA34-1CC73CF96102}"/>
-                </a:ext>
-              </a:extLst>
-            </p:cNvPr>
-            <p:cNvPicPr>
-              <a:picLocks noChangeAspect="1"/>
-            </p:cNvPicPr>
-            <p:nvPr/>
-          </p:nvPicPr>
-          <p:blipFill>
-            <a:blip r:embed="rId3"/>
-            <a:stretch>
-              <a:fillRect/>
-            </a:stretch>
-          </p:blipFill>
-          <p:spPr>
-            <a:xfrm>
-              <a:off x="6449292" y="731338"/>
-              <a:ext cx="5628904" cy="754273"/>
-            </a:xfrm>
-            <a:prstGeom prst="rect">
-              <a:avLst/>
-            </a:prstGeom>
-          </p:spPr>
-        </p:pic>
-        <p:sp>
-          <p:nvSpPr>
-            <p:cNvPr id="8" name="TextBox 7">
-              <a:extLst>
-                <a:ext uri="{FF2B5EF4-FFF2-40B4-BE49-F238E27FC236}">
-                  <a16:creationId xmlns:a16="http://schemas.microsoft.com/office/drawing/2014/main" id="{63D01851-62B3-F501-1DCC-FF54EB54AD3F}"/>
-                </a:ext>
-              </a:extLst>
-            </p:cNvPr>
-            <p:cNvSpPr txBox="1"/>
-            <p:nvPr/>
-          </p:nvSpPr>
-          <p:spPr>
-            <a:xfrm>
-              <a:off x="6449292" y="362006"/>
-              <a:ext cx="1656223" cy="369332"/>
-            </a:xfrm>
-            <a:prstGeom prst="rect">
-              <a:avLst/>
-            </a:prstGeom>
-            <a:noFill/>
-          </p:spPr>
-          <p:txBody>
-            <a:bodyPr wrap="none" rtlCol="0">
-              <a:spAutoFit/>
-            </a:bodyPr>
-            <a:lstStyle/>
-            <a:p>
-              <a:r>
-                <a:rPr lang="en-US" dirty="0"/>
-                <a:t>Command Line:</a:t>
-              </a:r>
-            </a:p>
-          </p:txBody>
-        </p:sp>
-      </p:grpSp>
       <p:pic>
         <p:nvPicPr>
           <p:cNvPr id="16" name="Picture 15">
@@ -4186,7 +4392,7 @@
           <p:nvPr/>
         </p:nvPicPr>
         <p:blipFill>
-          <a:blip r:embed="rId4"/>
+          <a:blip r:embed="rId3"/>
           <a:stretch>
             <a:fillRect/>
           </a:stretch>
@@ -4236,7 +4442,7 @@
             <p:nvPr/>
           </p:nvPicPr>
           <p:blipFill>
-            <a:blip r:embed="rId5"/>
+            <a:blip r:embed="rId4"/>
             <a:stretch>
               <a:fillRect/>
             </a:stretch>
@@ -4339,7 +4545,7 @@
             <p:nvPr/>
           </p:nvPicPr>
           <p:blipFill>
-            <a:blip r:embed="rId6"/>
+            <a:blip r:embed="rId5"/>
             <a:stretch>
               <a:fillRect/>
             </a:stretch>
@@ -4511,10 +4717,115 @@
           </a:p>
         </p:txBody>
       </p:sp>
+      <p:sp>
+        <p:nvSpPr>
+          <p:cNvPr id="4" name="TextBox 3">
+            <a:extLst>
+              <a:ext uri="{FF2B5EF4-FFF2-40B4-BE49-F238E27FC236}">
+                <a16:creationId xmlns:a16="http://schemas.microsoft.com/office/drawing/2014/main" id="{513F38A8-0534-4A7A-0782-1652FBF4D521}"/>
+              </a:ext>
+            </a:extLst>
+          </p:cNvPr>
+          <p:cNvSpPr txBox="1"/>
+          <p:nvPr/>
+        </p:nvSpPr>
+        <p:spPr>
+          <a:xfrm>
+            <a:off x="201292" y="5096212"/>
+            <a:ext cx="1926609" cy="523220"/>
+          </a:xfrm>
+          <a:prstGeom prst="rect">
+            <a:avLst/>
+          </a:prstGeom>
+          <a:noFill/>
+        </p:spPr>
+        <p:txBody>
+          <a:bodyPr wrap="square" rtlCol="0">
+            <a:spAutoFit/>
+          </a:bodyPr>
+          <a:lstStyle/>
+          <a:p>
+            <a:r>
+              <a:rPr lang="en-US" sz="1400" dirty="0"/>
+              <a:t>Open app and go to settings/preferences</a:t>
+            </a:r>
+          </a:p>
+        </p:txBody>
+      </p:sp>
+      <p:sp>
+        <p:nvSpPr>
+          <p:cNvPr id="5" name="TextBox 4">
+            <a:extLst>
+              <a:ext uri="{FF2B5EF4-FFF2-40B4-BE49-F238E27FC236}">
+                <a16:creationId xmlns:a16="http://schemas.microsoft.com/office/drawing/2014/main" id="{6CF74211-B6FB-7D36-F9CA-962C05B1B721}"/>
+              </a:ext>
+            </a:extLst>
+          </p:cNvPr>
+          <p:cNvSpPr txBox="1"/>
+          <p:nvPr/>
+        </p:nvSpPr>
+        <p:spPr>
+          <a:xfrm>
+            <a:off x="2990537" y="3065411"/>
+            <a:ext cx="851547" cy="307777"/>
+          </a:xfrm>
+          <a:prstGeom prst="rect">
+            <a:avLst/>
+          </a:prstGeom>
+          <a:noFill/>
+        </p:spPr>
+        <p:txBody>
+          <a:bodyPr wrap="square" rtlCol="0">
+            <a:spAutoFit/>
+          </a:bodyPr>
+          <a:lstStyle/>
+          <a:p>
+            <a:r>
+              <a:rPr lang="en-US" sz="1400" dirty="0"/>
+              <a:t>Sign in</a:t>
+            </a:r>
+          </a:p>
+        </p:txBody>
+      </p:sp>
+      <p:sp>
+        <p:nvSpPr>
+          <p:cNvPr id="7" name="TextBox 6">
+            <a:extLst>
+              <a:ext uri="{FF2B5EF4-FFF2-40B4-BE49-F238E27FC236}">
+                <a16:creationId xmlns:a16="http://schemas.microsoft.com/office/drawing/2014/main" id="{D4ED41DE-4FBA-D24F-CBFF-F880F7C7F018}"/>
+              </a:ext>
+            </a:extLst>
+          </p:cNvPr>
+          <p:cNvSpPr txBox="1"/>
+          <p:nvPr/>
+        </p:nvSpPr>
+        <p:spPr>
+          <a:xfrm>
+            <a:off x="10133713" y="2303991"/>
+            <a:ext cx="1256938" cy="523220"/>
+          </a:xfrm>
+          <a:prstGeom prst="rect">
+            <a:avLst/>
+          </a:prstGeom>
+          <a:noFill/>
+        </p:spPr>
+        <p:txBody>
+          <a:bodyPr wrap="square" rtlCol="0">
+            <a:spAutoFit/>
+          </a:bodyPr>
+          <a:lstStyle/>
+          <a:p>
+            <a:r>
+              <a:rPr lang="en-US" sz="1400" dirty="0"/>
+              <a:t>Finish in the browser</a:t>
+            </a:r>
+          </a:p>
+        </p:txBody>
+      </p:sp>
     </p:spTree>
     <p:extLst>
       <p:ext uri="{BB962C8B-B14F-4D97-AF65-F5344CB8AC3E}">
-        <p14:creationId xmlns:p14="http://schemas.microsoft.com/office/powerpoint/2010/main" val="2426871943"/>
+        <p14:creationId xmlns:p14="http://schemas.microsoft.com/office/powerpoint/2010/main" val="461842366"/>
       </p:ext>
     </p:extLst>
   </p:cSld>
@@ -4524,7 +4835,7 @@
 </p:sld>
 </file>
 
-<file path=ppt/slides/slide3.xml><?xml version="1.0" encoding="utf-8"?>
+<file path=ppt/slides/slide4.xml><?xml version="1.0" encoding="utf-8"?>
 <p:sld xmlns:a="http://schemas.openxmlformats.org/drawingml/2006/main" xmlns:r="http://schemas.openxmlformats.org/officeDocument/2006/relationships" xmlns:p="http://schemas.openxmlformats.org/presentationml/2006/main">
   <p:cSld>
     <p:spTree>
@@ -4689,7 +5000,7 @@
 </p:sld>
 </file>
 
-<file path=ppt/slides/slide4.xml><?xml version="1.0" encoding="utf-8"?>
+<file path=ppt/slides/slide5.xml><?xml version="1.0" encoding="utf-8"?>
 <p:sld xmlns:a="http://schemas.openxmlformats.org/drawingml/2006/main" xmlns:r="http://schemas.openxmlformats.org/officeDocument/2006/relationships" xmlns:p="http://schemas.openxmlformats.org/presentationml/2006/main">
   <p:cSld>
     <p:spTree>
@@ -4876,7 +5187,7 @@
 </p:sld>
 </file>
 
-<file path=ppt/slides/slide5.xml><?xml version="1.0" encoding="utf-8"?>
+<file path=ppt/slides/slide6.xml><?xml version="1.0" encoding="utf-8"?>
 <p:sld xmlns:a="http://schemas.openxmlformats.org/drawingml/2006/main" xmlns:r="http://schemas.openxmlformats.org/officeDocument/2006/relationships" xmlns:p="http://schemas.openxmlformats.org/presentationml/2006/main">
   <p:cSld>
     <p:spTree>

</xml_diff>